<commit_message>
Update SamplePPT w/ infl & payroll graphs
</commit_message>
<xml_diff>
--- a/DeckUpdate/DPFPS_v1.0.pptx
+++ b/DeckUpdate/DPFPS_v1.0.pptx
@@ -4,6 +4,9 @@
   <p:sldMasterIdLst>
     <p:sldMasterId id="2147483729" r:id="rId1"/>
   </p:sldMasterIdLst>
+  <p:notesMasterIdLst>
+    <p:NotesMasterId r:id="rId15"/>
+  </p:notesMasterIdLst>
   <p:sldIdLst>
     <p:sldId id="256" r:id="rId2"/>
     <p:sldId id="257" r:id="rId3"/>
@@ -16,6 +19,8 @@
     <p:sldId id="264" r:id="rId10"/>
     <p:sldId id="265" r:id="rId11"/>
     <p:sldId id="266" r:id="rId12"/>
+    <p:sldId id="267" r:id="rId13"/>
+    <p:sldId id="268" r:id="rId14"/>
   </p:sldIdLst>
   <p:sldSz cx="9144000" cy="6858000" type="screen4x3"/>
   <p:notesSz cx="6858000" cy="9144000"/>
@@ -131,6 +136,489 @@
     </p:ext>
   </p:extLst>
 </p:presentation>
+</file>
+
+<file path=ppt/notesMasters/notesMaster1.xml><?xml version="1.0" encoding="utf-8"?>
+<p:notesMaster xmlns:a="http://schemas.openxmlformats.org/drawingml/2006/main" xmlns:r="http://schemas.openxmlformats.org/officeDocument/2006/relationships" xmlns:p="http://schemas.openxmlformats.org/presentationml/2006/main">
+  <p:cSld>
+    <p:bg>
+      <p:bgRef idx="1001">
+        <a:schemeClr val="bg1"/>
+      </p:bgRef>
+    </p:bg>
+    <p:spTree>
+      <p:nvGrpSpPr>
+        <p:cNvPr id="1" name=""/>
+        <p:cNvGrpSpPr/>
+        <p:nvPr/>
+      </p:nvGrpSpPr>
+      <p:grpSpPr>
+        <a:xfrm>
+          <a:off x="0" y="0"/>
+          <a:ext cx="0" cy="0"/>
+          <a:chOff x="0" y="0"/>
+          <a:chExt cx="0" cy="0"/>
+        </a:xfrm>
+      </p:grpSpPr>
+      <p:sp>
+        <p:nvSpPr>
+          <p:cNvPr id="2" name="Header Placeholder 1"/>
+          <p:cNvSpPr>
+            <a:spLocks noGrp="1"/>
+          </p:cNvSpPr>
+          <p:nvPr>
+            <p:ph type="hdr" sz="quarter"/>
+          </p:nvPr>
+        </p:nvSpPr>
+        <p:spPr>
+          <a:xfrm>
+            <a:off x="0" y="0"/>
+            <a:ext cx="2971800" cy="457200"/>
+          </a:xfrm>
+          <a:prstGeom prst="rect">
+            <a:avLst/>
+          </a:prstGeom>
+        </p:spPr>
+        <p:txBody>
+          <a:bodyPr vert="horz" lIns="91440" tIns="45720" rIns="91440" bIns="45720" rtlCol="0"/>
+          <a:lstStyle>
+            <a:lvl1pPr algn="l">
+              <a:defRPr sz="1200"/>
+            </a:lvl1pPr>
+          </a:lstStyle>
+          <a:p>
+            <a:r>
+              <a:rPr lang="en-US" dirty="0"/>
+              <a:t>August 11, 2015</a:t>
+            </a:r>
+          </a:p>
+        </p:txBody>
+      </p:sp>
+      <p:sp>
+        <p:nvSpPr>
+          <p:cNvPr id="3" name="Date Placeholder 2"/>
+          <p:cNvSpPr>
+            <a:spLocks noGrp="1"/>
+          </p:cNvSpPr>
+          <p:nvPr>
+            <p:ph type="dt" idx="1"/>
+          </p:nvPr>
+        </p:nvSpPr>
+        <p:spPr>
+          <a:xfrm>
+            <a:off x="3884613" y="0"/>
+            <a:ext cx="2971800" cy="457200"/>
+          </a:xfrm>
+          <a:prstGeom prst="rect">
+            <a:avLst/>
+          </a:prstGeom>
+        </p:spPr>
+        <p:txBody>
+          <a:bodyPr vert="horz" lIns="91440" tIns="45720" rIns="91440" bIns="45720" rtlCol="0"/>
+          <a:lstStyle>
+            <a:lvl1pPr algn="r">
+              <a:defRPr sz="1200"/>
+            </a:lvl1pPr>
+          </a:lstStyle>
+          <a:p>
+            <a:fld id="{9468A949-E42B-CA49-90B4-62867DB2E519}" type="datetime1">
+              <a:rPr lang="en-US" smtClean="0"/>
+              <a:t>1/7/21</a:t>
+            </a:fld>
+            <a:endParaRPr lang="en-US" dirty="0"/>
+          </a:p>
+        </p:txBody>
+      </p:sp>
+      <p:sp>
+        <p:nvSpPr>
+          <p:cNvPr id="4" name="Slide Image Placeholder 3"/>
+          <p:cNvSpPr>
+            <a:spLocks noGrp="1" noRot="1" noChangeAspect="1"/>
+          </p:cNvSpPr>
+          <p:nvPr>
+            <p:ph type="sldImg" idx="2"/>
+          </p:nvPr>
+        </p:nvSpPr>
+        <p:spPr>
+          <a:xfrm>
+            <a:off x="1143000" y="685800"/>
+            <a:ext cx="4572000" cy="3429000"/>
+          </a:xfrm>
+          <a:prstGeom prst="rect">
+            <a:avLst/>
+          </a:prstGeom>
+          <a:noFill/>
+          <a:ln w="12700">
+            <a:solidFill>
+              <a:prstClr val="black"/>
+            </a:solidFill>
+          </a:ln>
+        </p:spPr>
+        <p:txBody>
+          <a:bodyPr vert="horz" lIns="91440" tIns="45720" rIns="91440" bIns="45720" rtlCol="0" anchor="ctr"/>
+          <a:lstStyle/>
+          <a:p>
+            <a:endParaRPr lang="en-US" dirty="0"/>
+          </a:p>
+        </p:txBody>
+      </p:sp>
+      <p:sp>
+        <p:nvSpPr>
+          <p:cNvPr id="5" name="Notes Placeholder 4"/>
+          <p:cNvSpPr>
+            <a:spLocks noGrp="1"/>
+          </p:cNvSpPr>
+          <p:nvPr>
+            <p:ph type="body" sz="quarter" idx="3"/>
+          </p:nvPr>
+        </p:nvSpPr>
+        <p:spPr>
+          <a:xfrm>
+            <a:off x="685800" y="4343400"/>
+            <a:ext cx="5486400" cy="4114800"/>
+          </a:xfrm>
+          <a:prstGeom prst="rect">
+            <a:avLst/>
+          </a:prstGeom>
+        </p:spPr>
+        <p:txBody>
+          <a:bodyPr vert="horz" lIns="91440" tIns="45720" rIns="91440" bIns="45720" rtlCol="0"/>
+          <a:lstStyle/>
+          <a:p>
+            <a:pPr lvl="0"/>
+            <a:r>
+              <a:rPr lang="en-US"/>
+              <a:t>Click to edit Master text styles</a:t>
+            </a:r>
+          </a:p>
+          <a:p>
+            <a:pPr lvl="1"/>
+            <a:r>
+              <a:rPr lang="en-US"/>
+              <a:t>Second level</a:t>
+            </a:r>
+          </a:p>
+          <a:p>
+            <a:pPr lvl="2"/>
+            <a:r>
+              <a:rPr lang="en-US"/>
+              <a:t>Third level</a:t>
+            </a:r>
+          </a:p>
+          <a:p>
+            <a:pPr lvl="3"/>
+            <a:r>
+              <a:rPr lang="en-US"/>
+              <a:t>Fourth level</a:t>
+            </a:r>
+          </a:p>
+          <a:p>
+            <a:pPr lvl="4"/>
+            <a:r>
+              <a:rPr lang="en-US"/>
+              <a:t>Fifth level</a:t>
+            </a:r>
+          </a:p>
+        </p:txBody>
+      </p:sp>
+      <p:sp>
+        <p:nvSpPr>
+          <p:cNvPr id="6" name="Footer Placeholder 5"/>
+          <p:cNvSpPr>
+            <a:spLocks noGrp="1"/>
+          </p:cNvSpPr>
+          <p:nvPr>
+            <p:ph type="ftr" sz="quarter" idx="4"/>
+          </p:nvPr>
+        </p:nvSpPr>
+        <p:spPr>
+          <a:xfrm>
+            <a:off x="0" y="8685213"/>
+            <a:ext cx="2971800" cy="457200"/>
+          </a:xfrm>
+          <a:prstGeom prst="rect">
+            <a:avLst/>
+          </a:prstGeom>
+        </p:spPr>
+        <p:txBody>
+          <a:bodyPr vert="horz" lIns="91440" tIns="45720" rIns="91440" bIns="45720" rtlCol="0" anchor="b"/>
+          <a:lstStyle>
+            <a:lvl1pPr algn="l">
+              <a:defRPr sz="1200"/>
+            </a:lvl1pPr>
+          </a:lstStyle>
+          <a:p>
+            <a:endParaRPr lang="en-US" dirty="0"/>
+          </a:p>
+        </p:txBody>
+      </p:sp>
+      <p:sp>
+        <p:nvSpPr>
+          <p:cNvPr id="7" name="Slide Number Placeholder 6"/>
+          <p:cNvSpPr>
+            <a:spLocks noGrp="1"/>
+          </p:cNvSpPr>
+          <p:nvPr>
+            <p:ph type="sldNum" sz="quarter" idx="5"/>
+          </p:nvPr>
+        </p:nvSpPr>
+        <p:spPr>
+          <a:xfrm>
+            <a:off x="3884613" y="8685213"/>
+            <a:ext cx="2971800" cy="457200"/>
+          </a:xfrm>
+          <a:prstGeom prst="rect">
+            <a:avLst/>
+          </a:prstGeom>
+        </p:spPr>
+        <p:txBody>
+          <a:bodyPr vert="horz" lIns="91440" tIns="45720" rIns="91440" bIns="45720" rtlCol="0" anchor="b"/>
+          <a:lstStyle>
+            <a:lvl1pPr algn="r">
+              <a:defRPr sz="1200"/>
+            </a:lvl1pPr>
+          </a:lstStyle>
+          <a:p>
+            <a:fld id="{28D1BD3F-7FC6-4D46-BFD7-875AA1307A33}" type="slidenum">
+              <a:rPr lang="en-US" smtClean="0"/>
+              <a:t>‹#›</a:t>
+            </a:fld>
+            <a:endParaRPr lang="en-US" dirty="0"/>
+          </a:p>
+        </p:txBody>
+      </p:sp>
+    </p:spTree>
+    <p:extLst>
+      <p:ext uri="{BB962C8B-B14F-4D97-AF65-F5344CB8AC3E}">
+        <p14:creationId xmlns:p14="http://schemas.microsoft.com/office/powerpoint/2010/main" val="4035445831"/>
+      </p:ext>
+    </p:extLst>
+  </p:cSld>
+  <p:clrMap bg1="lt1" tx1="dk1" bg2="lt2" tx2="dk2" accent1="accent1" accent2="accent2" accent3="accent3" accent4="accent4" accent5="accent5" accent6="accent6" hlink="hlink" folHlink="folHlink"/>
+  <p:hf hdr="0" ftr="0" dt="0"/>
+  <p:notesStyle>
+    <a:lvl1pPr marL="0" algn="l" defTabSz="457200" rtl="0" eaLnBrk="1" latinLnBrk="0" hangingPunct="1">
+      <a:defRPr sz="1200" kern="1200">
+        <a:solidFill>
+          <a:schemeClr val="tx1"/>
+        </a:solidFill>
+        <a:latin typeface="+mn-lt"/>
+        <a:ea typeface="+mn-ea"/>
+        <a:cs typeface="+mn-cs"/>
+      </a:defRPr>
+    </a:lvl1pPr>
+    <a:lvl2pPr marL="457200" algn="l" defTabSz="457200" rtl="0" eaLnBrk="1" latinLnBrk="0" hangingPunct="1">
+      <a:defRPr sz="1200" kern="1200">
+        <a:solidFill>
+          <a:schemeClr val="tx1"/>
+        </a:solidFill>
+        <a:latin typeface="+mn-lt"/>
+        <a:ea typeface="+mn-ea"/>
+        <a:cs typeface="+mn-cs"/>
+      </a:defRPr>
+    </a:lvl2pPr>
+    <a:lvl3pPr marL="914400" algn="l" defTabSz="457200" rtl="0" eaLnBrk="1" latinLnBrk="0" hangingPunct="1">
+      <a:defRPr sz="1200" kern="1200">
+        <a:solidFill>
+          <a:schemeClr val="tx1"/>
+        </a:solidFill>
+        <a:latin typeface="+mn-lt"/>
+        <a:ea typeface="+mn-ea"/>
+        <a:cs typeface="+mn-cs"/>
+      </a:defRPr>
+    </a:lvl3pPr>
+    <a:lvl4pPr marL="1371600" algn="l" defTabSz="457200" rtl="0" eaLnBrk="1" latinLnBrk="0" hangingPunct="1">
+      <a:defRPr sz="1200" kern="1200">
+        <a:solidFill>
+          <a:schemeClr val="tx1"/>
+        </a:solidFill>
+        <a:latin typeface="+mn-lt"/>
+        <a:ea typeface="+mn-ea"/>
+        <a:cs typeface="+mn-cs"/>
+      </a:defRPr>
+    </a:lvl4pPr>
+    <a:lvl5pPr marL="1828800" algn="l" defTabSz="457200" rtl="0" eaLnBrk="1" latinLnBrk="0" hangingPunct="1">
+      <a:defRPr sz="1200" kern="1200">
+        <a:solidFill>
+          <a:schemeClr val="tx1"/>
+        </a:solidFill>
+        <a:latin typeface="+mn-lt"/>
+        <a:ea typeface="+mn-ea"/>
+        <a:cs typeface="+mn-cs"/>
+      </a:defRPr>
+    </a:lvl5pPr>
+    <a:lvl6pPr marL="2286000" algn="l" defTabSz="457200" rtl="0" eaLnBrk="1" latinLnBrk="0" hangingPunct="1">
+      <a:defRPr sz="1200" kern="1200">
+        <a:solidFill>
+          <a:schemeClr val="tx1"/>
+        </a:solidFill>
+        <a:latin typeface="+mn-lt"/>
+        <a:ea typeface="+mn-ea"/>
+        <a:cs typeface="+mn-cs"/>
+      </a:defRPr>
+    </a:lvl6pPr>
+    <a:lvl7pPr marL="2743200" algn="l" defTabSz="457200" rtl="0" eaLnBrk="1" latinLnBrk="0" hangingPunct="1">
+      <a:defRPr sz="1200" kern="1200">
+        <a:solidFill>
+          <a:schemeClr val="tx1"/>
+        </a:solidFill>
+        <a:latin typeface="+mn-lt"/>
+        <a:ea typeface="+mn-ea"/>
+        <a:cs typeface="+mn-cs"/>
+      </a:defRPr>
+    </a:lvl7pPr>
+    <a:lvl8pPr marL="3200400" algn="l" defTabSz="457200" rtl="0" eaLnBrk="1" latinLnBrk="0" hangingPunct="1">
+      <a:defRPr sz="1200" kern="1200">
+        <a:solidFill>
+          <a:schemeClr val="tx1"/>
+        </a:solidFill>
+        <a:latin typeface="+mn-lt"/>
+        <a:ea typeface="+mn-ea"/>
+        <a:cs typeface="+mn-cs"/>
+      </a:defRPr>
+    </a:lvl8pPr>
+    <a:lvl9pPr marL="3657600" algn="l" defTabSz="457200" rtl="0" eaLnBrk="1" latinLnBrk="0" hangingPunct="1">
+      <a:defRPr sz="1200" kern="1200">
+        <a:solidFill>
+          <a:schemeClr val="tx1"/>
+        </a:solidFill>
+        <a:latin typeface="+mn-lt"/>
+        <a:ea typeface="+mn-ea"/>
+        <a:cs typeface="+mn-cs"/>
+      </a:defRPr>
+    </a:lvl9pPr>
+  </p:notesStyle>
+</p:notesMaster>
+</file>
+
+<file path=ppt/notesSlides/notesSlide1.xml><?xml version="1.0" encoding="utf-8"?>
+<p:notes xmlns:a="http://schemas.openxmlformats.org/drawingml/2006/main" xmlns:r="http://schemas.openxmlformats.org/officeDocument/2006/relationships" xmlns:p="http://schemas.openxmlformats.org/presentationml/2006/main">
+  <p:cSld>
+    <p:spTree>
+      <p:nvGrpSpPr>
+        <p:cNvPr id="1" name=""/>
+        <p:cNvGrpSpPr/>
+        <p:nvPr/>
+      </p:nvGrpSpPr>
+      <p:grpSpPr>
+        <a:xfrm>
+          <a:off x="0" y="0"/>
+          <a:ext cx="0" cy="0"/>
+          <a:chOff x="0" y="0"/>
+          <a:chExt cx="0" cy="0"/>
+        </a:xfrm>
+      </p:grpSpPr>
+      <p:sp>
+        <p:nvSpPr>
+          <p:cNvPr id="2" name="Slide Image Placeholder 1"/>
+          <p:cNvSpPr>
+            <a:spLocks noGrp="1" noRot="1" noChangeAspect="1"/>
+          </p:cNvSpPr>
+          <p:nvPr>
+            <p:ph type="sldImg"/>
+          </p:nvPr>
+        </p:nvSpPr>
+        <p:spPr/>
+      </p:sp>
+      <p:sp>
+        <p:nvSpPr>
+          <p:cNvPr id="3" name="Notes Placeholder 2"/>
+          <p:cNvSpPr>
+            <a:spLocks noGrp="1"/>
+          </p:cNvSpPr>
+          <p:nvPr>
+            <p:ph type="body" idx="1"/>
+          </p:nvPr>
+        </p:nvSpPr>
+        <p:spPr/>
+        <p:txBody>
+          <a:bodyPr/>
+          <a:lstStyle/>
+          <a:p>
+            <a:pPr lvl="0" marL="0" indent="0">
+              <a:buNone/>
+            </a:pPr>
+            <a:r>
+              <a:rPr/>
+              <a:t>Mountain</a:t>
+            </a:r>
+            <a:r>
+              <a:rPr/>
+              <a:t> </a:t>
+            </a:r>
+            <a:r>
+              <a:rPr/>
+              <a:t>of</a:t>
+            </a:r>
+            <a:r>
+              <a:rPr/>
+              <a:t> </a:t>
+            </a:r>
+            <a:r>
+              <a:rPr/>
+              <a:t>Debt</a:t>
+            </a:r>
+            <a:r>
+              <a:rPr/>
+              <a:t> </a:t>
+            </a:r>
+            <a:r>
+              <a:rPr/>
+              <a:t>Plot</a:t>
+            </a:r>
+            <a:r>
+              <a:rPr/>
+              <a:t> </a:t>
+            </a:r>
+            <a:r>
+              <a:rPr/>
+              <a:t>for</a:t>
+            </a:r>
+            <a:r>
+              <a:rPr/>
+              <a:t> </a:t>
+            </a:r>
+            <a:r>
+              <a:rPr/>
+              <a:t>Dallas</a:t>
+            </a:r>
+            <a:r>
+              <a:rPr/>
+              <a:t> </a:t>
+            </a:r>
+            <a:r>
+              <a:rPr/>
+              <a:t>PFPS</a:t>
+            </a:r>
+          </a:p>
+        </p:txBody>
+      </p:sp>
+      <p:sp>
+        <p:nvSpPr>
+          <p:cNvPr id="4" name="Slide Number Placeholder 3"/>
+          <p:cNvSpPr>
+            <a:spLocks noGrp="1"/>
+          </p:cNvSpPr>
+          <p:nvPr>
+            <p:ph type="sldNum" sz="quarter" idx="10"/>
+          </p:nvPr>
+        </p:nvSpPr>
+        <p:spPr/>
+        <p:txBody>
+          <a:bodyPr/>
+          <a:lstStyle/>
+          <a:p>
+            <a:fld id="{28D1BD3F-7FC6-4D46-BFD7-875AA1307A33}" type="slidenum">
+              <a:rPr lang="en-US"/>
+              <a:t>3</a:t>
+            </a:fld>
+            <a:endParaRPr lang="en-US"/>
+          </a:p>
+        </p:txBody>
+      </p:sp>
+    </p:spTree>
+  </p:cSld>
+</p:notes>
 </file>
 
 <file path=ppt/slideLayouts/slideLayout1.xml><?xml version="1.0" encoding="utf-8"?>
@@ -3806,15 +4294,15 @@
             </a:r>
             <a:r>
               <a:rPr/>
-              <a:t>January</a:t>
-            </a:r>
-            <a:r>
-              <a:rPr/>
-              <a:t> </a:t>
-            </a:r>
-            <a:r>
-              <a:rPr/>
-              <a:t>26,</a:t>
+              <a:t>February</a:t>
+            </a:r>
+            <a:r>
+              <a:rPr/>
+              <a:t> </a:t>
+            </a:r>
+            <a:r>
+              <a:rPr/>
+              <a:t>18,</a:t>
             </a:r>
             <a:r>
               <a:rPr/>
@@ -3847,7 +4335,7 @@
             </a:pPr>
             <a:r>
               <a:rPr/>
-              <a:t>02/15/2021</a:t>
+              <a:t>02/218/2021</a:t>
             </a:r>
           </a:p>
         </p:txBody>
@@ -3902,23 +4390,47 @@
             </a:pPr>
             <a:r>
               <a:rPr/>
-              <a:t>Negative</a:t>
-            </a:r>
-            <a:r>
-              <a:rPr/>
-              <a:t> </a:t>
-            </a:r>
-            <a:r>
-              <a:rPr/>
-              <a:t>Amortization</a:t>
-            </a:r>
-            <a:r>
-              <a:rPr/>
-              <a:t> </a:t>
-            </a:r>
-            <a:r>
-              <a:rPr/>
-              <a:t>Growth</a:t>
+              <a:t>Actual</a:t>
+            </a:r>
+            <a:r>
+              <a:rPr/>
+              <a:t> </a:t>
+            </a:r>
+            <a:r>
+              <a:rPr/>
+              <a:t>Change</a:t>
+            </a:r>
+            <a:r>
+              <a:rPr/>
+              <a:t> </a:t>
+            </a:r>
+            <a:r>
+              <a:rPr/>
+              <a:t>in</a:t>
+            </a:r>
+            <a:r>
+              <a:rPr/>
+              <a:t> </a:t>
+            </a:r>
+            <a:r>
+              <a:rPr/>
+              <a:t>Payroll</a:t>
+            </a:r>
+            <a:r>
+              <a:rPr/>
+              <a:t> </a:t>
+            </a:r>
+            <a:r>
+              <a:rPr/>
+              <a:t>vs. Assumption</a:t>
+            </a:r>
+            <a:r>
+              <a:rPr/>
+              <a:t> </a:t>
+            </a:r>
+            <a:r>
+              <a:rPr/>
+              <a:t>(2001-2019)</a:t>
             </a:r>
             <a:r>
               <a:rPr/>
@@ -3942,14 +4454,14 @@
             </a:r>
             <a:r>
               <a:rPr/>
-              <a:t>(custom)</a:t>
+              <a:t>(linePlot())</a:t>
             </a:r>
           </a:p>
         </p:txBody>
       </p:sp>
       <p:pic>
         <p:nvPicPr>
-          <p:cNvPr descr="DPFPS_v1.0_files/figure-pptx/neg.amo-1.png" id="0" name="Picture 1"/>
+          <p:cNvPr descr="DPFPS_v1.0_files/figure-pptx/payroll-1.png" id="0" name="Picture 1"/>
           <p:cNvPicPr>
             <a:picLocks noGrp="1" noChangeAspect="1"/>
           </p:cNvPicPr>
@@ -4027,54 +4539,387 @@
             </a:pPr>
             <a:r>
               <a:rPr/>
-              <a:t>References</a:t>
-            </a:r>
-          </a:p>
-        </p:txBody>
-      </p:sp>
-      <p:sp>
-        <p:nvSpPr>
-          <p:cNvPr id="3" name="Content Placeholder 2"/>
-          <p:cNvSpPr>
-            <a:spLocks noGrp="1"/>
-          </p:cNvSpPr>
-          <p:nvPr>
-            <p:ph idx="1"/>
-          </p:nvPr>
-        </p:nvSpPr>
-        <p:spPr/>
+              <a:t>Actual</a:t>
+            </a:r>
+            <a:r>
+              <a:rPr/>
+              <a:t> </a:t>
+            </a:r>
+            <a:r>
+              <a:rPr/>
+              <a:t>Inflation</a:t>
+            </a:r>
+            <a:r>
+              <a:rPr/>
+              <a:t> </a:t>
+            </a:r>
+            <a:r>
+              <a:rPr/>
+              <a:t>vs. Assumption</a:t>
+            </a:r>
+            <a:r>
+              <a:rPr/>
+              <a:t> </a:t>
+            </a:r>
+            <a:r>
+              <a:rPr/>
+              <a:t>(2001-2019)</a:t>
+            </a:r>
+            <a:r>
+              <a:rPr/>
+              <a:t> </a:t>
+            </a:r>
+            <a:r>
+              <a:rPr/>
+              <a:t>w/</a:t>
+            </a:r>
+            <a:r>
+              <a:rPr/>
+              <a:t> </a:t>
+            </a:r>
+            <a:r>
+              <a:rPr/>
+              <a:t>R</a:t>
+            </a:r>
+            <a:r>
+              <a:rPr/>
+              <a:t> </a:t>
+            </a:r>
+            <a:r>
+              <a:rPr/>
+              <a:t>(linePlot())</a:t>
+            </a:r>
+          </a:p>
+        </p:txBody>
+      </p:sp>
+      <p:pic>
+        <p:nvPicPr>
+          <p:cNvPr descr="DPFPS_v1.0_files/figure-pptx/inflation-1.png" id="0" name="Picture 1"/>
+          <p:cNvPicPr>
+            <a:picLocks noGrp="1" noChangeAspect="1"/>
+          </p:cNvPicPr>
+          <p:nvPr/>
+        </p:nvPicPr>
+        <p:blipFill>
+          <a:blip r:embed="rId2"/>
+          <a:stretch>
+            <a:fillRect/>
+          </a:stretch>
+        </p:blipFill>
+        <p:spPr bwMode="auto">
+          <a:xfrm>
+            <a:off x="673100" y="1600200"/>
+            <a:ext cx="7797800" cy="4876800"/>
+          </a:xfrm>
+          <a:prstGeom prst="rect">
+            <a:avLst/>
+          </a:prstGeom>
+          <a:noFill/>
+          <a:ln w="9525">
+            <a:noFill/>
+            <a:headEnd/>
+            <a:tailEnd/>
+          </a:ln>
+        </p:spPr>
+      </p:pic>
+    </p:spTree>
+  </p:cSld>
+</p:sld>
+</file>
+
+<file path=ppt/slides/slide12.xml><?xml version="1.0" encoding="utf-8"?>
+<p:sld xmlns:a="http://schemas.openxmlformats.org/drawingml/2006/main" xmlns:r="http://schemas.openxmlformats.org/officeDocument/2006/relationships" xmlns:p="http://schemas.openxmlformats.org/presentationml/2006/main">
+  <p:cSld>
+    <p:spTree>
+      <p:nvGrpSpPr>
+        <p:cNvPr id="1" name=""/>
+        <p:cNvGrpSpPr/>
+        <p:nvPr/>
+      </p:nvGrpSpPr>
+      <p:grpSpPr>
+        <a:xfrm>
+          <a:off x="0" y="0"/>
+          <a:ext cx="0" cy="0"/>
+          <a:chOff x="0" y="0"/>
+          <a:chExt cx="0" cy="0"/>
+        </a:xfrm>
+      </p:grpSpPr>
+      <p:sp>
+        <p:nvSpPr>
+          <p:cNvPr id="2" name="Title 1"/>
+          <p:cNvSpPr>
+            <a:spLocks noGrp="1"/>
+          </p:cNvSpPr>
+          <p:nvPr>
+            <p:ph type="title" hasCustomPrompt="1"/>
+          </p:nvPr>
+        </p:nvSpPr>
+        <p:spPr>
+          <a:xfrm>
+            <a:off x="457200" y="533400"/>
+            <a:ext cx="7864475" cy="990600"/>
+          </a:xfrm>
+          <a:prstGeom prst="rect">
+            <a:avLst/>
+          </a:prstGeom>
+        </p:spPr>
         <p:txBody>
           <a:bodyPr/>
           <a:lstStyle/>
           <a:p>
-            <a:pPr lvl="1"/>
-            <a:r>
-              <a:rPr>
-                <a:hlinkClick r:id="rId2"/>
-              </a:rPr>
-              <a:t>https://github.com/ReasonFoundation/GraphicsR</a:t>
-            </a:r>
-          </a:p>
-          <a:p>
-            <a:pPr lvl="1"/>
-            <a:r>
-              <a:rPr>
-                <a:hlinkClick r:id="rId3"/>
-              </a:rPr>
-              <a:t>https://rstudio.com/wp-content/uploads/2015/03/rmarkdown-reference.pdf</a:t>
-            </a:r>
-          </a:p>
-          <a:p>
-            <a:pPr lvl="1"/>
-            <a:r>
-              <a:rPr>
-                <a:hlinkClick r:id="rId4"/>
-              </a:rPr>
-              <a:t>https://bookdown.org/yihui/rmarkdown/</a:t>
-            </a:r>
-          </a:p>
-        </p:txBody>
-      </p:sp>
+            <a:pPr lvl="0" marL="0" indent="0">
+              <a:buNone/>
+            </a:pPr>
+            <a:r>
+              <a:rPr/>
+              <a:t>Debt</a:t>
+            </a:r>
+            <a:r>
+              <a:rPr/>
+              <a:t> </a:t>
+            </a:r>
+            <a:r>
+              <a:rPr/>
+              <a:t>Interest</a:t>
+            </a:r>
+            <a:r>
+              <a:rPr/>
+              <a:t> </a:t>
+            </a:r>
+            <a:r>
+              <a:rPr/>
+              <a:t>vs. Unfunded</a:t>
+            </a:r>
+            <a:r>
+              <a:rPr/>
+              <a:t> </a:t>
+            </a:r>
+            <a:r>
+              <a:rPr/>
+              <a:t>Liability</a:t>
+            </a:r>
+            <a:r>
+              <a:rPr/>
+              <a:t> </a:t>
+            </a:r>
+            <a:r>
+              <a:rPr/>
+              <a:t>Payments</a:t>
+            </a:r>
+            <a:r>
+              <a:rPr/>
+              <a:t> </a:t>
+            </a:r>
+            <a:r>
+              <a:rPr/>
+              <a:t>(2001-2019)</a:t>
+            </a:r>
+            <a:r>
+              <a:rPr/>
+              <a:t> </a:t>
+            </a:r>
+            <a:r>
+              <a:rPr/>
+              <a:t>w/</a:t>
+            </a:r>
+            <a:r>
+              <a:rPr/>
+              <a:t> </a:t>
+            </a:r>
+            <a:r>
+              <a:rPr/>
+              <a:t>R</a:t>
+            </a:r>
+            <a:r>
+              <a:rPr/>
+              <a:t> </a:t>
+            </a:r>
+            <a:r>
+              <a:rPr/>
+              <a:t>(custom)</a:t>
+            </a:r>
+          </a:p>
+        </p:txBody>
+      </p:sp>
+      <p:pic>
+        <p:nvPicPr>
+          <p:cNvPr descr="DPFPS_v1.0_files/figure-pptx/neg.amo-1.png" id="0" name="Picture 1"/>
+          <p:cNvPicPr>
+            <a:picLocks noGrp="1" noChangeAspect="1"/>
+          </p:cNvPicPr>
+          <p:nvPr/>
+        </p:nvPicPr>
+        <p:blipFill>
+          <a:blip r:embed="rId2"/>
+          <a:stretch>
+            <a:fillRect/>
+          </a:stretch>
+        </p:blipFill>
+        <p:spPr bwMode="auto">
+          <a:xfrm>
+            <a:off x="673100" y="1600200"/>
+            <a:ext cx="7797800" cy="4876800"/>
+          </a:xfrm>
+          <a:prstGeom prst="rect">
+            <a:avLst/>
+          </a:prstGeom>
+          <a:noFill/>
+          <a:ln w="9525">
+            <a:noFill/>
+            <a:headEnd/>
+            <a:tailEnd/>
+          </a:ln>
+        </p:spPr>
+      </p:pic>
+    </p:spTree>
+  </p:cSld>
+</p:sld>
+</file>
+
+<file path=ppt/slides/slide13.xml><?xml version="1.0" encoding="utf-8"?>
+<p:sld xmlns:a="http://schemas.openxmlformats.org/drawingml/2006/main" xmlns:r="http://schemas.openxmlformats.org/officeDocument/2006/relationships" xmlns:p="http://schemas.openxmlformats.org/presentationml/2006/main">
+  <p:cSld>
+    <p:spTree>
+      <p:nvGrpSpPr>
+        <p:cNvPr id="1" name=""/>
+        <p:cNvGrpSpPr/>
+        <p:nvPr/>
+      </p:nvGrpSpPr>
+      <p:grpSpPr>
+        <a:xfrm>
+          <a:off x="0" y="0"/>
+          <a:ext cx="0" cy="0"/>
+          <a:chOff x="0" y="0"/>
+          <a:chExt cx="0" cy="0"/>
+        </a:xfrm>
+      </p:grpSpPr>
+      <p:sp>
+        <p:nvSpPr>
+          <p:cNvPr id="2" name="Title 1"/>
+          <p:cNvSpPr>
+            <a:spLocks noGrp="1"/>
+          </p:cNvSpPr>
+          <p:nvPr>
+            <p:ph type="title" hasCustomPrompt="1"/>
+          </p:nvPr>
+        </p:nvSpPr>
+        <p:spPr>
+          <a:xfrm>
+            <a:off x="457200" y="533400"/>
+            <a:ext cx="7864475" cy="990600"/>
+          </a:xfrm>
+          <a:prstGeom prst="rect">
+            <a:avLst/>
+          </a:prstGeom>
+        </p:spPr>
+        <p:txBody>
+          <a:bodyPr/>
+          <a:lstStyle/>
+          <a:p>
+            <a:pPr lvl="0" marL="0" indent="0">
+              <a:buNone/>
+            </a:pPr>
+            <a:r>
+              <a:rPr/>
+              <a:t>Current</a:t>
+            </a:r>
+            <a:r>
+              <a:rPr/>
+              <a:t> </a:t>
+            </a:r>
+            <a:r>
+              <a:rPr/>
+              <a:t>Contributions</a:t>
+            </a:r>
+            <a:r>
+              <a:rPr/>
+              <a:t> </a:t>
+            </a:r>
+            <a:r>
+              <a:rPr/>
+              <a:t>Are</a:t>
+            </a:r>
+            <a:r>
+              <a:rPr/>
+              <a:t> </a:t>
+            </a:r>
+            <a:r>
+              <a:rPr/>
+              <a:t>Actuarially</a:t>
+            </a:r>
+            <a:r>
+              <a:rPr/>
+              <a:t> </a:t>
+            </a:r>
+            <a:r>
+              <a:rPr/>
+              <a:t>Insufficient</a:t>
+            </a:r>
+            <a:r>
+              <a:rPr/>
+              <a:t> </a:t>
+            </a:r>
+            <a:r>
+              <a:rPr/>
+              <a:t>(2001-2019)</a:t>
+            </a:r>
+            <a:r>
+              <a:rPr/>
+              <a:t> </a:t>
+            </a:r>
+            <a:r>
+              <a:rPr/>
+              <a:t>w/</a:t>
+            </a:r>
+            <a:r>
+              <a:rPr/>
+              <a:t> </a:t>
+            </a:r>
+            <a:r>
+              <a:rPr/>
+              <a:t>R</a:t>
+            </a:r>
+            <a:r>
+              <a:rPr/>
+              <a:t> </a:t>
+            </a:r>
+            <a:r>
+              <a:rPr/>
+              <a:t>(linePlot())</a:t>
+            </a:r>
+          </a:p>
+        </p:txBody>
+      </p:sp>
+      <p:pic>
+        <p:nvPicPr>
+          <p:cNvPr descr="DPFPS_v1.0_files/figure-pptx/crises-1.png" id="0" name="Picture 1"/>
+          <p:cNvPicPr>
+            <a:picLocks noGrp="1" noChangeAspect="1"/>
+          </p:cNvPicPr>
+          <p:nvPr/>
+        </p:nvPicPr>
+        <p:blipFill>
+          <a:blip r:embed="rId2"/>
+          <a:stretch>
+            <a:fillRect/>
+          </a:stretch>
+        </p:blipFill>
+        <p:spPr bwMode="auto">
+          <a:xfrm>
+            <a:off x="673100" y="1600200"/>
+            <a:ext cx="7797800" cy="4876800"/>
+          </a:xfrm>
+          <a:prstGeom prst="rect">
+            <a:avLst/>
+          </a:prstGeom>
+          <a:noFill/>
+          <a:ln w="9525">
+            <a:noFill/>
+            <a:headEnd/>
+            <a:tailEnd/>
+          </a:ln>
+        </p:spPr>
+      </p:pic>
     </p:spTree>
   </p:cSld>
 </p:sld>
@@ -4326,7 +5171,7 @@
             </a:r>
             <a:r>
               <a:rPr/>
-              <a:t>(2001-2020)</a:t>
+              <a:t>(2001-2019)</a:t>
             </a:r>
             <a:r>
               <a:rPr/>
@@ -4364,7 +5209,7 @@
           <p:nvPr/>
         </p:nvPicPr>
         <p:blipFill>
-          <a:blip r:embed="rId2"/>
+          <a:blip r:embed="rId3"/>
           <a:stretch>
             <a:fillRect/>
           </a:stretch>
@@ -4467,7 +5312,7 @@
             </a:r>
             <a:r>
               <a:rPr/>
-              <a:t>(2001-2020)</a:t>
+              <a:t>(2001-2019)</a:t>
             </a:r>
             <a:r>
               <a:rPr/>
@@ -4506,7 +5351,7 @@
       </p:sp>
       <p:pic>
         <p:nvPicPr>
-          <p:cNvPr descr="GainLoss.png" id="0" name="Picture 1"/>
+          <p:cNvPr descr="DPFP.GainLoss.png" id="0" name="Picture 1"/>
           <p:cNvPicPr>
             <a:picLocks noGrp="1" noChangeAspect="1"/>
           </p:cNvPicPr>
@@ -4520,8 +5365,8 @@
         </p:blipFill>
         <p:spPr bwMode="auto">
           <a:xfrm>
-            <a:off x="774700" y="1600200"/>
-            <a:ext cx="7581900" cy="4876800"/>
+            <a:off x="584200" y="1600200"/>
+            <a:ext cx="7975600" cy="4876800"/>
           </a:xfrm>
           <a:prstGeom prst="rect">
             <a:avLst/>
@@ -4772,7 +5617,7 @@
                       </a:pPr>
                       <a:r>
                         <a:rPr/>
-                        <a:t>7.4%</a:t>
+                        <a:t>13.5%</a:t>
                       </a:r>
                     </a:p>
                   </a:txBody>
@@ -4787,7 +5632,7 @@
                       </a:pPr>
                       <a:r>
                         <a:rPr/>
-                        <a:t>$257,060,520</a:t>
+                        <a:t>$32,977,425</a:t>
                       </a:r>
                     </a:p>
                   </a:txBody>
@@ -4835,7 +5680,7 @@
                       </a:pPr>
                       <a:r>
                         <a:rPr/>
-                        <a:t>7.5%</a:t>
+                        <a:t>3.2%</a:t>
                       </a:r>
                     </a:p>
                   </a:txBody>
@@ -4850,7 +5695,7 @@
                       </a:pPr>
                       <a:r>
                         <a:rPr/>
-                        <a:t>$252,981,080</a:t>
+                        <a:t>$11,038,570</a:t>
                       </a:r>
                     </a:p>
                   </a:txBody>
@@ -4898,7 +5743,7 @@
                       </a:pPr>
                       <a:r>
                         <a:rPr/>
-                        <a:t>4.5%</a:t>
+                        <a:t>38.7%</a:t>
                       </a:r>
                     </a:p>
                   </a:txBody>
@@ -4913,7 +5758,7 @@
                       </a:pPr>
                       <a:r>
                         <a:rPr/>
-                        <a:t>$152,532,710</a:t>
+                        <a:t>$133,881,595</a:t>
                       </a:r>
                     </a:p>
                   </a:txBody>
@@ -4953,7 +5798,7 @@
                       </a:pPr>
                       <a:r>
                         <a:rPr/>
-                        <a:t>12.0%</a:t>
+                        <a:t>41.9%</a:t>
                       </a:r>
                     </a:p>
                   </a:txBody>
@@ -4968,7 +5813,7 @@
                       </a:pPr>
                       <a:r>
                         <a:rPr/>
-                        <a:t>$405,513,790</a:t>
+                        <a:t>$144,920,166</a:t>
                       </a:r>
                     </a:p>
                   </a:txBody>
@@ -4993,7 +5838,47 @@
                       </a:r>
                       <a:r>
                         <a:rPr/>
-                        <a:t>PERSI</a:t>
+                        <a:t>Dallas</a:t>
+                      </a:r>
+                      <a:r>
+                        <a:rPr/>
+                        <a:t> </a:t>
+                      </a:r>
+                      <a:r>
+                        <a:rPr/>
+                        <a:t>Police</a:t>
+                      </a:r>
+                      <a:r>
+                        <a:rPr/>
+                        <a:t> </a:t>
+                      </a:r>
+                      <a:r>
+                        <a:rPr/>
+                        <a:t>and</a:t>
+                      </a:r>
+                      <a:r>
+                        <a:rPr/>
+                        <a:t> </a:t>
+                      </a:r>
+                      <a:r>
+                        <a:rPr/>
+                        <a:t>Fire</a:t>
+                      </a:r>
+                      <a:r>
+                        <a:rPr/>
+                        <a:t> </a:t>
+                      </a:r>
+                      <a:r>
+                        <a:rPr/>
+                        <a:t>Pension</a:t>
+                      </a:r>
+                      <a:r>
+                        <a:rPr/>
+                        <a:t> </a:t>
+                      </a:r>
+                      <a:r>
+                        <a:rPr/>
+                        <a:t>System</a:t>
                       </a:r>
                       <a:r>
                         <a:rPr/>
@@ -5016,7 +5901,7 @@
                       </a:pPr>
                       <a:r>
                         <a:rPr/>
-                        <a:t>19.4%</a:t>
+                        <a:t>55.4%</a:t>
                       </a:r>
                     </a:p>
                   </a:txBody>
@@ -5031,7 +5916,7 @@
                       </a:pPr>
                       <a:r>
                         <a:rPr/>
-                        <a:t>$647,141,440</a:t>
+                        <a:t>$198,688,830</a:t>
                       </a:r>
                     </a:p>
                   </a:txBody>
@@ -5193,7 +6078,7 @@
             </a:r>
             <a:r>
               <a:rPr/>
-              <a:t>(2001-2020)</a:t>
+              <a:t>(2001-2019)</a:t>
             </a:r>
             <a:r>
               <a:rPr/>
@@ -5326,7 +6211,7 @@
             </a:r>
             <a:r>
               <a:rPr/>
-              <a:t>(2001-2020)</a:t>
+              <a:t>(2001-2019)</a:t>
             </a:r>
             <a:r>
               <a:rPr/>
@@ -5451,7 +6336,7 @@
             </a:r>
             <a:r>
               <a:rPr/>
-              <a:t>(2001-2020)</a:t>
+              <a:t>(2001-2019)</a:t>
             </a:r>
             <a:r>
               <a:rPr/>
@@ -5608,7 +6493,7 @@
             </a:r>
             <a:r>
               <a:rPr/>
-              <a:t>(2001-2020)</a:t>
+              <a:t>(2001-2019)</a:t>
             </a:r>
             <a:r>
               <a:rPr/>
@@ -5963,4 +6848,324 @@
     </a:ext>
   </a:extLst>
 </a:theme>
+</file>
+
+<file path=ppt/theme/theme2.xml><?xml version="1.0" encoding="utf-8"?>
+<a:theme xmlns:a="http://schemas.openxmlformats.org/drawingml/2006/main" name="Office Theme">
+  <a:themeElements>
+    <a:clrScheme name="Office">
+      <a:dk1>
+        <a:sysClr val="windowText" lastClr="000000"/>
+      </a:dk1>
+      <a:lt1>
+        <a:sysClr val="window" lastClr="FFFFFF"/>
+      </a:lt1>
+      <a:dk2>
+        <a:srgbClr val="1F497D"/>
+      </a:dk2>
+      <a:lt2>
+        <a:srgbClr val="EEECE1"/>
+      </a:lt2>
+      <a:accent1>
+        <a:srgbClr val="4F81BD"/>
+      </a:accent1>
+      <a:accent2>
+        <a:srgbClr val="C0504D"/>
+      </a:accent2>
+      <a:accent3>
+        <a:srgbClr val="9BBB59"/>
+      </a:accent3>
+      <a:accent4>
+        <a:srgbClr val="8064A2"/>
+      </a:accent4>
+      <a:accent5>
+        <a:srgbClr val="4BACC6"/>
+      </a:accent5>
+      <a:accent6>
+        <a:srgbClr val="F79646"/>
+      </a:accent6>
+      <a:hlink>
+        <a:srgbClr val="0000FF"/>
+      </a:hlink>
+      <a:folHlink>
+        <a:srgbClr val="800080"/>
+      </a:folHlink>
+    </a:clrScheme>
+    <a:fontScheme name="Office">
+      <a:majorFont>
+        <a:latin typeface="Calibri"/>
+        <a:ea typeface=""/>
+        <a:cs typeface=""/>
+        <a:font script="Jpan" typeface="ＭＳ Ｐゴシック"/>
+        <a:font script="Hang" typeface="맑은 고딕"/>
+        <a:font script="Hans" typeface="宋体"/>
+        <a:font script="Hant" typeface="新細明體"/>
+        <a:font script="Arab" typeface="Times New Roman"/>
+        <a:font script="Hebr" typeface="Times New Roman"/>
+        <a:font script="Thai" typeface="Angsana New"/>
+        <a:font script="Ethi" typeface="Nyala"/>
+        <a:font script="Beng" typeface="Vrinda"/>
+        <a:font script="Gujr" typeface="Shruti"/>
+        <a:font script="Khmr" typeface="MoolBoran"/>
+        <a:font script="Knda" typeface="Tunga"/>
+        <a:font script="Guru" typeface="Raavi"/>
+        <a:font script="Cans" typeface="Euphemia"/>
+        <a:font script="Cher" typeface="Plantagenet Cherokee"/>
+        <a:font script="Yiii" typeface="Microsoft Yi Baiti"/>
+        <a:font script="Tibt" typeface="Microsoft Himalaya"/>
+        <a:font script="Thaa" typeface="MV Boli"/>
+        <a:font script="Deva" typeface="Mangal"/>
+        <a:font script="Telu" typeface="Gautami"/>
+        <a:font script="Taml" typeface="Latha"/>
+        <a:font script="Syrc" typeface="Estrangelo Edessa"/>
+        <a:font script="Orya" typeface="Kalinga"/>
+        <a:font script="Mlym" typeface="Kartika"/>
+        <a:font script="Laoo" typeface="DokChampa"/>
+        <a:font script="Sinh" typeface="Iskoola Pota"/>
+        <a:font script="Mong" typeface="Mongolian Baiti"/>
+        <a:font script="Viet" typeface="Times New Roman"/>
+        <a:font script="Uigh" typeface="Microsoft Uighur"/>
+        <a:font script="Geor" typeface="Sylfaen"/>
+      </a:majorFont>
+      <a:minorFont>
+        <a:latin typeface="Calibri"/>
+        <a:ea typeface=""/>
+        <a:cs typeface=""/>
+        <a:font script="Jpan" typeface="ＭＳ Ｐゴシック"/>
+        <a:font script="Hang" typeface="맑은 고딕"/>
+        <a:font script="Hans" typeface="宋体"/>
+        <a:font script="Hant" typeface="新細明體"/>
+        <a:font script="Arab" typeface="Arial"/>
+        <a:font script="Hebr" typeface="Arial"/>
+        <a:font script="Thai" typeface="Cordia New"/>
+        <a:font script="Ethi" typeface="Nyala"/>
+        <a:font script="Beng" typeface="Vrinda"/>
+        <a:font script="Gujr" typeface="Shruti"/>
+        <a:font script="Khmr" typeface="DaunPenh"/>
+        <a:font script="Knda" typeface="Tunga"/>
+        <a:font script="Guru" typeface="Raavi"/>
+        <a:font script="Cans" typeface="Euphemia"/>
+        <a:font script="Cher" typeface="Plantagenet Cherokee"/>
+        <a:font script="Yiii" typeface="Microsoft Yi Baiti"/>
+        <a:font script="Tibt" typeface="Microsoft Himalaya"/>
+        <a:font script="Thaa" typeface="MV Boli"/>
+        <a:font script="Deva" typeface="Mangal"/>
+        <a:font script="Telu" typeface="Gautami"/>
+        <a:font script="Taml" typeface="Latha"/>
+        <a:font script="Syrc" typeface="Estrangelo Edessa"/>
+        <a:font script="Orya" typeface="Kalinga"/>
+        <a:font script="Mlym" typeface="Kartika"/>
+        <a:font script="Laoo" typeface="DokChampa"/>
+        <a:font script="Sinh" typeface="Iskoola Pota"/>
+        <a:font script="Mong" typeface="Mongolian Baiti"/>
+        <a:font script="Viet" typeface="Arial"/>
+        <a:font script="Uigh" typeface="Microsoft Uighur"/>
+        <a:font script="Geor" typeface="Sylfaen"/>
+      </a:minorFont>
+    </a:fontScheme>
+    <a:fmtScheme name="Office">
+      <a:fillStyleLst>
+        <a:solidFill>
+          <a:schemeClr val="phClr"/>
+        </a:solidFill>
+        <a:gradFill rotWithShape="1">
+          <a:gsLst>
+            <a:gs pos="0">
+              <a:schemeClr val="phClr">
+                <a:tint val="50000"/>
+                <a:satMod val="300000"/>
+              </a:schemeClr>
+            </a:gs>
+            <a:gs pos="35000">
+              <a:schemeClr val="phClr">
+                <a:tint val="37000"/>
+                <a:satMod val="300000"/>
+              </a:schemeClr>
+            </a:gs>
+            <a:gs pos="100000">
+              <a:schemeClr val="phClr">
+                <a:tint val="15000"/>
+                <a:satMod val="350000"/>
+              </a:schemeClr>
+            </a:gs>
+          </a:gsLst>
+          <a:lin ang="16200000" scaled="1"/>
+        </a:gradFill>
+        <a:gradFill rotWithShape="1">
+          <a:gsLst>
+            <a:gs pos="0">
+              <a:schemeClr val="phClr">
+                <a:tint val="100000"/>
+                <a:shade val="100000"/>
+                <a:satMod val="130000"/>
+              </a:schemeClr>
+            </a:gs>
+            <a:gs pos="100000">
+              <a:schemeClr val="phClr">
+                <a:tint val="50000"/>
+                <a:shade val="100000"/>
+                <a:satMod val="350000"/>
+              </a:schemeClr>
+            </a:gs>
+          </a:gsLst>
+          <a:lin ang="16200000" scaled="0"/>
+        </a:gradFill>
+      </a:fillStyleLst>
+      <a:lnStyleLst>
+        <a:ln w="9525" cap="flat" cmpd="sng" algn="ctr">
+          <a:solidFill>
+            <a:schemeClr val="phClr">
+              <a:shade val="95000"/>
+              <a:satMod val="105000"/>
+            </a:schemeClr>
+          </a:solidFill>
+          <a:prstDash val="solid"/>
+        </a:ln>
+        <a:ln w="25400" cap="flat" cmpd="sng" algn="ctr">
+          <a:solidFill>
+            <a:schemeClr val="phClr"/>
+          </a:solidFill>
+          <a:prstDash val="solid"/>
+        </a:ln>
+        <a:ln w="38100" cap="flat" cmpd="sng" algn="ctr">
+          <a:solidFill>
+            <a:schemeClr val="phClr"/>
+          </a:solidFill>
+          <a:prstDash val="solid"/>
+        </a:ln>
+      </a:lnStyleLst>
+      <a:effectStyleLst>
+        <a:effectStyle>
+          <a:effectLst>
+            <a:outerShdw blurRad="40000" dist="20000" dir="5400000" rotWithShape="0">
+              <a:srgbClr val="000000">
+                <a:alpha val="38000"/>
+              </a:srgbClr>
+            </a:outerShdw>
+          </a:effectLst>
+        </a:effectStyle>
+        <a:effectStyle>
+          <a:effectLst>
+            <a:outerShdw blurRad="40000" dist="23000" dir="5400000" rotWithShape="0">
+              <a:srgbClr val="000000">
+                <a:alpha val="35000"/>
+              </a:srgbClr>
+            </a:outerShdw>
+          </a:effectLst>
+        </a:effectStyle>
+        <a:effectStyle>
+          <a:effectLst>
+            <a:outerShdw blurRad="40000" dist="23000" dir="5400000" rotWithShape="0">
+              <a:srgbClr val="000000">
+                <a:alpha val="35000"/>
+              </a:srgbClr>
+            </a:outerShdw>
+          </a:effectLst>
+          <a:scene3d>
+            <a:camera prst="orthographicFront">
+              <a:rot lat="0" lon="0" rev="0"/>
+            </a:camera>
+            <a:lightRig rig="threePt" dir="t">
+              <a:rot lat="0" lon="0" rev="1200000"/>
+            </a:lightRig>
+          </a:scene3d>
+          <a:sp3d>
+            <a:bevelT w="63500" h="25400"/>
+          </a:sp3d>
+        </a:effectStyle>
+      </a:effectStyleLst>
+      <a:bgFillStyleLst>
+        <a:solidFill>
+          <a:schemeClr val="phClr"/>
+        </a:solidFill>
+        <a:gradFill rotWithShape="1">
+          <a:gsLst>
+            <a:gs pos="0">
+              <a:schemeClr val="phClr">
+                <a:tint val="40000"/>
+                <a:satMod val="350000"/>
+              </a:schemeClr>
+            </a:gs>
+            <a:gs pos="40000">
+              <a:schemeClr val="phClr">
+                <a:tint val="45000"/>
+                <a:shade val="99000"/>
+                <a:satMod val="350000"/>
+              </a:schemeClr>
+            </a:gs>
+            <a:gs pos="100000">
+              <a:schemeClr val="phClr">
+                <a:shade val="20000"/>
+                <a:satMod val="255000"/>
+              </a:schemeClr>
+            </a:gs>
+          </a:gsLst>
+          <a:path path="circle">
+            <a:fillToRect l="50000" t="-80000" r="50000" b="180000"/>
+          </a:path>
+        </a:gradFill>
+        <a:gradFill rotWithShape="1">
+          <a:gsLst>
+            <a:gs pos="0">
+              <a:schemeClr val="phClr">
+                <a:tint val="80000"/>
+                <a:satMod val="300000"/>
+              </a:schemeClr>
+            </a:gs>
+            <a:gs pos="100000">
+              <a:schemeClr val="phClr">
+                <a:shade val="30000"/>
+                <a:satMod val="200000"/>
+              </a:schemeClr>
+            </a:gs>
+          </a:gsLst>
+          <a:path path="circle">
+            <a:fillToRect l="50000" t="50000" r="50000" b="50000"/>
+          </a:path>
+        </a:gradFill>
+      </a:bgFillStyleLst>
+    </a:fmtScheme>
+  </a:themeElements>
+  <a:objectDefaults>
+    <a:spDef>
+      <a:spPr/>
+      <a:bodyPr/>
+      <a:lstStyle/>
+      <a:style>
+        <a:lnRef idx="1">
+          <a:schemeClr val="accent1"/>
+        </a:lnRef>
+        <a:fillRef idx="3">
+          <a:schemeClr val="accent1"/>
+        </a:fillRef>
+        <a:effectRef idx="2">
+          <a:schemeClr val="accent1"/>
+        </a:effectRef>
+        <a:fontRef idx="minor">
+          <a:schemeClr val="lt1"/>
+        </a:fontRef>
+      </a:style>
+    </a:spDef>
+    <a:lnDef>
+      <a:spPr/>
+      <a:bodyPr/>
+      <a:lstStyle/>
+      <a:style>
+        <a:lnRef idx="2">
+          <a:schemeClr val="accent1"/>
+        </a:lnRef>
+        <a:fillRef idx="0">
+          <a:schemeClr val="accent1"/>
+        </a:fillRef>
+        <a:effectRef idx="1">
+          <a:schemeClr val="accent1"/>
+        </a:effectRef>
+        <a:fontRef idx="minor">
+          <a:schemeClr val="tx1"/>
+        </a:fontRef>
+      </a:style>
+    </a:lnDef>
+  </a:objectDefaults>
+  <a:extraClrSchemeLst/>
+</a:theme>
 </file>
</xml_diff>